<commit_message>
Arduino: ledin_vilkuttelu ja servomoottoripotikalla
</commit_message>
<xml_diff>
--- a/tehtavat/tiedostot/maol/power_point/Racket-MAOL-5-6-symmetriset kuviot.pptx
+++ b/tehtavat/tiedostot/maol/power_point/Racket-MAOL-5-6-symmetriset kuviot.pptx
@@ -178,6 +178,10 @@
     </p:ext>
   </p:extLst>
 </p:presentation>
+</file>
+
+<file path=ppt/revisionInfo.xml><?xml version="1.0" encoding="utf-8"?>
+<p1510:revInfo xmlns:a="http://schemas.openxmlformats.org/drawingml/2006/main" xmlns:r="http://schemas.openxmlformats.org/officeDocument/2006/relationships" xmlns:p1510="http://schemas.microsoft.com/office/powerpoint/2015/10/main"/>
 </file>
 
 <file path=ppt/notesMasters/notesMaster1.xml><?xml version="1.0" encoding="utf-8"?>
@@ -11028,7 +11032,7 @@
                 </a:solidFill>
                 <a:latin typeface="Arial" charset="0"/>
               </a:rPr>
-              <a:t>Testaa, että pala toimii oikein. Kirjoita alempaan ikkunaan </a:t>
+              <a:t>Testaa, että pala toimii oikein. Kirjoita interaktio- ikkunaan </a:t>
             </a:r>
             <a:r>
               <a:rPr lang="fi-FI" sz="2600" dirty="0">

</xml_diff>